<commit_message>
Updated syllabus for the new term
</commit_message>
<xml_diff>
--- a/Slides/Wk9Day1-GeolocationOverview.pptx
+++ b/Slides/Wk9Day1-GeolocationOverview.pptx
@@ -5,7 +5,7 @@
     <p:sldMasterId id="2147483797" r:id="rId1"/>
   </p:sldMasterIdLst>
   <p:notesMasterIdLst>
-    <p:notesMasterId r:id="rId11"/>
+    <p:notesMasterId r:id="rId13"/>
   </p:notesMasterIdLst>
   <p:sldIdLst>
     <p:sldId id="256" r:id="rId2"/>
@@ -17,6 +17,8 @@
     <p:sldId id="277" r:id="rId8"/>
     <p:sldId id="275" r:id="rId9"/>
     <p:sldId id="276" r:id="rId10"/>
+    <p:sldId id="278" r:id="rId11"/>
+    <p:sldId id="279" r:id="rId12"/>
   </p:sldIdLst>
   <p:sldSz cx="9144000" cy="6858000" type="screen4x3"/>
   <p:notesSz cx="6858000" cy="9144000"/>
@@ -129,6 +131,8 @@
             <p14:sldId id="277"/>
             <p14:sldId id="275"/>
             <p14:sldId id="276"/>
+            <p14:sldId id="278"/>
+            <p14:sldId id="279"/>
           </p14:sldIdLst>
         </p14:section>
         <p14:section name="Untitled Section" id="{40D5F567-697D-144C-AE61-72CA3F64225C}">
@@ -236,7 +240,7 @@
           <a:p>
             <a:fld id="{59B6F58A-1DC9-9140-A6F1-5CAF629CE03F}" type="datetimeFigureOut">
               <a:rPr lang="en-US" smtClean="0"/>
-              <a:t>2/26/18</a:t>
+              <a:t>7/18/18</a:t>
             </a:fld>
             <a:endParaRPr lang="en-US"/>
           </a:p>
@@ -1293,7 +1297,7 @@
           <a:p>
             <a:fld id="{7CE38E4D-051A-41E1-86A4-E56916468FD0}" type="datetimeFigureOut">
               <a:rPr lang="en-US" smtClean="0"/>
-              <a:t>2/26/18</a:t>
+              <a:t>7/18/18</a:t>
             </a:fld>
             <a:endParaRPr lang="en-US"/>
           </a:p>
@@ -1456,7 +1460,7 @@
           <a:p>
             <a:fld id="{7CE38E4D-051A-41E1-86A4-E56916468FD0}" type="datetimeFigureOut">
               <a:rPr lang="en-US" smtClean="0"/>
-              <a:t>2/26/18</a:t>
+              <a:t>7/18/18</a:t>
             </a:fld>
             <a:endParaRPr lang="en-US"/>
           </a:p>
@@ -1631,7 +1635,7 @@
           <a:p>
             <a:fld id="{7CE38E4D-051A-41E1-86A4-E56916468FD0}" type="datetimeFigureOut">
               <a:rPr lang="en-US" smtClean="0"/>
-              <a:t>2/26/18</a:t>
+              <a:t>7/18/18</a:t>
             </a:fld>
             <a:endParaRPr lang="en-US"/>
           </a:p>
@@ -1796,7 +1800,7 @@
           <a:p>
             <a:fld id="{7CE38E4D-051A-41E1-86A4-E56916468FD0}" type="datetimeFigureOut">
               <a:rPr lang="en-US" smtClean="0"/>
-              <a:t>2/26/18</a:t>
+              <a:t>7/18/18</a:t>
             </a:fld>
             <a:endParaRPr lang="en-US"/>
           </a:p>
@@ -2035,7 +2039,7 @@
           <a:p>
             <a:fld id="{7CE38E4D-051A-41E1-86A4-E56916468FD0}" type="datetimeFigureOut">
               <a:rPr lang="en-US" smtClean="0"/>
-              <a:t>2/26/18</a:t>
+              <a:t>7/18/18</a:t>
             </a:fld>
             <a:endParaRPr lang="en-US"/>
           </a:p>
@@ -2315,7 +2319,7 @@
           <a:p>
             <a:fld id="{7CE38E4D-051A-41E1-86A4-E56916468FD0}" type="datetimeFigureOut">
               <a:rPr lang="en-US" smtClean="0"/>
-              <a:t>2/26/18</a:t>
+              <a:t>7/18/18</a:t>
             </a:fld>
             <a:endParaRPr lang="en-US"/>
           </a:p>
@@ -2730,7 +2734,7 @@
           <a:p>
             <a:fld id="{7CE38E4D-051A-41E1-86A4-E56916468FD0}" type="datetimeFigureOut">
               <a:rPr lang="en-US" smtClean="0"/>
-              <a:t>2/26/18</a:t>
+              <a:t>7/18/18</a:t>
             </a:fld>
             <a:endParaRPr lang="en-US"/>
           </a:p>
@@ -2842,7 +2846,7 @@
           <a:p>
             <a:fld id="{7CE38E4D-051A-41E1-86A4-E56916468FD0}" type="datetimeFigureOut">
               <a:rPr lang="en-US" smtClean="0"/>
-              <a:t>2/26/18</a:t>
+              <a:t>7/18/18</a:t>
             </a:fld>
             <a:endParaRPr lang="en-US"/>
           </a:p>
@@ -2932,7 +2936,7 @@
           <a:p>
             <a:fld id="{7CE38E4D-051A-41E1-86A4-E56916468FD0}" type="datetimeFigureOut">
               <a:rPr lang="en-US" smtClean="0"/>
-              <a:t>2/26/18</a:t>
+              <a:t>7/18/18</a:t>
             </a:fld>
             <a:endParaRPr lang="en-US"/>
           </a:p>
@@ -3210,7 +3214,7 @@
           <a:p>
             <a:fld id="{7CE38E4D-051A-41E1-86A4-E56916468FD0}" type="datetimeFigureOut">
               <a:rPr lang="en-US" smtClean="0"/>
-              <a:t>2/26/18</a:t>
+              <a:t>7/18/18</a:t>
             </a:fld>
             <a:endParaRPr lang="en-US"/>
           </a:p>
@@ -3468,7 +3472,7 @@
           <a:p>
             <a:fld id="{7CE38E4D-051A-41E1-86A4-E56916468FD0}" type="datetimeFigureOut">
               <a:rPr lang="en-US" smtClean="0"/>
-              <a:t>2/26/18</a:t>
+              <a:t>7/18/18</a:t>
             </a:fld>
             <a:endParaRPr lang="en-US"/>
           </a:p>
@@ -3676,7 +3680,7 @@
           <a:p>
             <a:fld id="{7CE38E4D-051A-41E1-86A4-E56916468FD0}" type="datetimeFigureOut">
               <a:rPr lang="en-US" smtClean="0"/>
-              <a:t>2/26/18</a:t>
+              <a:t>7/18/18</a:t>
             </a:fld>
             <a:endParaRPr lang="en-US"/>
           </a:p>
@@ -4234,6 +4238,212 @@
     <p:extLst>
       <p:ext uri="{BB962C8B-B14F-4D97-AF65-F5344CB8AC3E}">
         <p14:creationId xmlns:p14="http://schemas.microsoft.com/office/powerpoint/2010/main" val="2429706375"/>
+      </p:ext>
+    </p:extLst>
+  </p:cSld>
+  <p:clrMapOvr>
+    <a:masterClrMapping/>
+  </p:clrMapOvr>
+</p:sld>
+</file>
+
+<file path=ppt/slides/slide10.xml><?xml version="1.0" encoding="utf-8"?>
+<p:sld xmlns:a="http://schemas.openxmlformats.org/drawingml/2006/main" xmlns:r="http://schemas.openxmlformats.org/officeDocument/2006/relationships" xmlns:p="http://schemas.openxmlformats.org/presentationml/2006/main">
+  <p:cSld>
+    <p:bg>
+      <p:bgPr>
+        <a:gradFill rotWithShape="1">
+          <a:gsLst>
+            <a:gs pos="86000">
+              <a:schemeClr val="bg1">
+                <a:lumMod val="75000"/>
+                <a:lumOff val="25000"/>
+              </a:schemeClr>
+            </a:gs>
+            <a:gs pos="0">
+              <a:schemeClr val="tx1">
+                <a:lumMod val="85000"/>
+              </a:schemeClr>
+            </a:gs>
+          </a:gsLst>
+          <a:lin ang="5400000" scaled="0"/>
+        </a:gradFill>
+        <a:effectLst/>
+      </p:bgPr>
+    </p:bg>
+    <p:spTree>
+      <p:nvGrpSpPr>
+        <p:cNvPr id="1" name=""/>
+        <p:cNvGrpSpPr/>
+        <p:nvPr/>
+      </p:nvGrpSpPr>
+      <p:grpSpPr>
+        <a:xfrm>
+          <a:off x="0" y="0"/>
+          <a:ext cx="0" cy="0"/>
+          <a:chOff x="0" y="0"/>
+          <a:chExt cx="0" cy="0"/>
+        </a:xfrm>
+      </p:grpSpPr>
+      <p:sp>
+        <p:nvSpPr>
+          <p:cNvPr id="2" name="Title 1">
+            <a:extLst>
+              <a:ext uri="{FF2B5EF4-FFF2-40B4-BE49-F238E27FC236}">
+                <a16:creationId xmlns:a16="http://schemas.microsoft.com/office/drawing/2014/main" id="{E40E19BE-DE32-9043-9603-4CB3A7122176}"/>
+              </a:ext>
+            </a:extLst>
+          </p:cNvPr>
+          <p:cNvSpPr>
+            <a:spLocks noGrp="1"/>
+          </p:cNvSpPr>
+          <p:nvPr>
+            <p:ph type="title"/>
+          </p:nvPr>
+        </p:nvSpPr>
+        <p:spPr/>
+        <p:txBody>
+          <a:bodyPr/>
+          <a:lstStyle/>
+          <a:p>
+            <a:r>
+              <a:rPr lang="en-US" dirty="0">
+                <a:solidFill>
+                  <a:schemeClr val="accent4">
+                    <a:lumMod val="75000"/>
+                  </a:schemeClr>
+                </a:solidFill>
+              </a:rPr>
+              <a:t>Testing on an Emulator</a:t>
+            </a:r>
+          </a:p>
+        </p:txBody>
+      </p:sp>
+      <p:sp>
+        <p:nvSpPr>
+          <p:cNvPr id="3" name="Content Placeholder 2">
+            <a:extLst>
+              <a:ext uri="{FF2B5EF4-FFF2-40B4-BE49-F238E27FC236}">
+                <a16:creationId xmlns:a16="http://schemas.microsoft.com/office/drawing/2014/main" id="{F5320E13-07D9-BD49-9692-8ED1E34F9BE5}"/>
+              </a:ext>
+            </a:extLst>
+          </p:cNvPr>
+          <p:cNvSpPr>
+            <a:spLocks noGrp="1"/>
+          </p:cNvSpPr>
+          <p:nvPr>
+            <p:ph idx="1"/>
+          </p:nvPr>
+        </p:nvSpPr>
+        <p:spPr/>
+        <p:txBody>
+          <a:bodyPr/>
+          <a:lstStyle/>
+          <a:p>
+            <a:endParaRPr lang="en-US" dirty="0"/>
+          </a:p>
+        </p:txBody>
+      </p:sp>
+    </p:spTree>
+    <p:extLst>
+      <p:ext uri="{BB962C8B-B14F-4D97-AF65-F5344CB8AC3E}">
+        <p14:creationId xmlns:p14="http://schemas.microsoft.com/office/powerpoint/2010/main" val="4074466235"/>
+      </p:ext>
+    </p:extLst>
+  </p:cSld>
+  <p:clrMapOvr>
+    <a:masterClrMapping/>
+  </p:clrMapOvr>
+</p:sld>
+</file>
+
+<file path=ppt/slides/slide11.xml><?xml version="1.0" encoding="utf-8"?>
+<p:sld xmlns:a="http://schemas.openxmlformats.org/drawingml/2006/main" xmlns:r="http://schemas.openxmlformats.org/officeDocument/2006/relationships" xmlns:p="http://schemas.openxmlformats.org/presentationml/2006/main">
+  <p:cSld>
+    <p:spTree>
+      <p:nvGrpSpPr>
+        <p:cNvPr id="1" name=""/>
+        <p:cNvGrpSpPr/>
+        <p:nvPr/>
+      </p:nvGrpSpPr>
+      <p:grpSpPr>
+        <a:xfrm>
+          <a:off x="0" y="0"/>
+          <a:ext cx="0" cy="0"/>
+          <a:chOff x="0" y="0"/>
+          <a:chExt cx="0" cy="0"/>
+        </a:xfrm>
+      </p:grpSpPr>
+      <p:sp>
+        <p:nvSpPr>
+          <p:cNvPr id="2" name="Title 1"/>
+          <p:cNvSpPr>
+            <a:spLocks noGrp="1"/>
+          </p:cNvSpPr>
+          <p:nvPr>
+            <p:ph type="title"/>
+          </p:nvPr>
+        </p:nvSpPr>
+        <p:spPr/>
+        <p:txBody>
+          <a:bodyPr/>
+          <a:lstStyle/>
+          <a:p>
+            <a:r>
+              <a:rPr lang="en-US" dirty="0"/>
+              <a:t>Simulating Location</a:t>
+            </a:r>
+          </a:p>
+        </p:txBody>
+      </p:sp>
+      <p:sp>
+        <p:nvSpPr>
+          <p:cNvPr id="3" name="Content Placeholder 2"/>
+          <p:cNvSpPr>
+            <a:spLocks noGrp="1"/>
+          </p:cNvSpPr>
+          <p:nvPr>
+            <p:ph idx="1"/>
+          </p:nvPr>
+        </p:nvSpPr>
+        <p:spPr/>
+        <p:txBody>
+          <a:bodyPr>
+            <a:normAutofit/>
+          </a:bodyPr>
+          <a:lstStyle/>
+          <a:p>
+            <a:r>
+              <a:rPr lang="en-US" dirty="0"/>
+              <a:t> Android Location Services API</a:t>
+            </a:r>
+          </a:p>
+          <a:p>
+            <a:pPr lvl="1"/>
+            <a:r>
+              <a:rPr lang="en-US" dirty="0"/>
+              <a:t>The Google Emulator Control panel lets you send mock location points to the emulator. </a:t>
+            </a:r>
+          </a:p>
+          <a:p>
+            <a:r>
+              <a:rPr lang="en-US" dirty="0"/>
+              <a:t>Fused Location Provider</a:t>
+            </a:r>
+          </a:p>
+          <a:p>
+            <a:pPr lvl="1"/>
+            <a:r>
+              <a:rPr lang="en-US" dirty="0"/>
+              <a:t>You have to publish mock locations programmatically.</a:t>
+            </a:r>
+          </a:p>
+        </p:txBody>
+      </p:sp>
+    </p:spTree>
+    <p:extLst>
+      <p:ext uri="{BB962C8B-B14F-4D97-AF65-F5344CB8AC3E}">
+        <p14:creationId xmlns:p14="http://schemas.microsoft.com/office/powerpoint/2010/main" val="3205566467"/>
       </p:ext>
     </p:extLst>
   </p:cSld>
@@ -5644,7 +5854,7 @@
         <p:spPr/>
         <p:txBody>
           <a:bodyPr>
-            <a:normAutofit fontScale="77500" lnSpcReduction="20000"/>
+            <a:normAutofit fontScale="92500" lnSpcReduction="20000"/>
           </a:bodyPr>
           <a:lstStyle/>
           <a:p>
@@ -5686,19 +5896,18 @@
               <a:rPr lang="en-US" dirty="0"/>
               <a:t>Preferred by Google, requires Google Play Services</a:t>
             </a:r>
-          </a:p>
-          <a:p>
-            <a:r>
+            <a:br>
               <a:rPr lang="en-US" dirty="0"/>
-              <a:t> Xamarin Geolocator Plugin</a:t>
-            </a:r>
-          </a:p>
-          <a:p>
-            <a:pPr lvl="1"/>
+            </a:br>
             <a:r>
               <a:rPr lang="en-US" dirty="0"/>
-              <a:t>Cross-platform: Android, iOS, Windows</a:t>
-            </a:r>
+              <a:t>(Covered in separate </a:t>
+            </a:r>
+            <a:r>
+              <a:rPr lang="en-US"/>
+              <a:t>PPT slides)</a:t>
+            </a:r>
+            <a:endParaRPr lang="en-US" dirty="0"/>
           </a:p>
         </p:txBody>
       </p:sp>

</xml_diff>